<commit_message>
working through mvc6 ndc
</commit_message>
<xml_diff>
--- a/aspnet5/slides/a2_mvc6.pptx
+++ b/aspnet5/slides/a2_mvc6.pptx
@@ -5,10 +5,10 @@
     <p:sldMasterId id="2147483772" r:id="rId1"/>
   </p:sldMasterIdLst>
   <p:notesMasterIdLst>
-    <p:notesMasterId r:id="rId17"/>
+    <p:notesMasterId r:id="rId26"/>
   </p:notesMasterIdLst>
   <p:handoutMasterIdLst>
-    <p:handoutMasterId r:id="rId18"/>
+    <p:handoutMasterId r:id="rId27"/>
   </p:handoutMasterIdLst>
   <p:sldIdLst>
     <p:sldId id="327" r:id="rId2"/>
@@ -24,8 +24,17 @@
     <p:sldId id="338" r:id="rId12"/>
     <p:sldId id="340" r:id="rId13"/>
     <p:sldId id="341" r:id="rId14"/>
-    <p:sldId id="328" r:id="rId15"/>
-    <p:sldId id="329" r:id="rId16"/>
+    <p:sldId id="343" r:id="rId15"/>
+    <p:sldId id="344" r:id="rId16"/>
+    <p:sldId id="345" r:id="rId17"/>
+    <p:sldId id="346" r:id="rId18"/>
+    <p:sldId id="347" r:id="rId19"/>
+    <p:sldId id="353" r:id="rId20"/>
+    <p:sldId id="349" r:id="rId21"/>
+    <p:sldId id="350" r:id="rId22"/>
+    <p:sldId id="351" r:id="rId23"/>
+    <p:sldId id="352" r:id="rId24"/>
+    <p:sldId id="329" r:id="rId25"/>
   </p:sldIdLst>
   <p:sldSz cx="9144000" cy="6858000" type="screen4x3"/>
   <p:notesSz cx="7302500" cy="9588500"/>
@@ -172,7 +181,16 @@
             <p14:sldId id="338"/>
             <p14:sldId id="340"/>
             <p14:sldId id="341"/>
-            <p14:sldId id="328"/>
+            <p14:sldId id="343"/>
+            <p14:sldId id="344"/>
+            <p14:sldId id="345"/>
+            <p14:sldId id="346"/>
+            <p14:sldId id="347"/>
+            <p14:sldId id="353"/>
+            <p14:sldId id="349"/>
+            <p14:sldId id="350"/>
+            <p14:sldId id="351"/>
+            <p14:sldId id="352"/>
             <p14:sldId id="329"/>
           </p14:sldIdLst>
         </p14:section>
@@ -301,7 +319,7 @@
               <a:pPr>
                 <a:defRPr/>
               </a:pPr>
-              <a:t>1/7/2016</a:t>
+              <a:t>1/9/2016</a:t>
             </a:fld>
             <a:endParaRPr lang="en-US"/>
           </a:p>
@@ -2715,7 +2733,6 @@
               <a:rPr lang="en-US" dirty="0" smtClean="0"/>
               <a:t>ASP.NET MVC 6</a:t>
             </a:r>
-            <a:endParaRPr lang="en-US" dirty="0" smtClean="0"/>
           </a:p>
         </p:txBody>
       </p:sp>
@@ -2742,21 +2759,15 @@
             <a:pPr algn="ctr" defTabSz="914400" eaLnBrk="1" hangingPunct="1"/>
             <a:r>
               <a:rPr lang="en-US" dirty="0" smtClean="0"/>
-              <a:t>Working with MVC 6 </a:t>
-            </a:r>
-          </a:p>
-          <a:p>
-            <a:pPr algn="ctr" defTabSz="914400" eaLnBrk="1" hangingPunct="1"/>
+              <a:t>Working with </a:t>
+            </a:r>
             <a:r>
               <a:rPr lang="en-US" dirty="0" smtClean="0"/>
-              <a:t>With </a:t>
-            </a:r>
-          </a:p>
-          <a:p>
-            <a:pPr algn="ctr" defTabSz="914400" eaLnBrk="1" hangingPunct="1"/>
+              <a:t>What’s </a:t>
+            </a:r>
             <a:r>
               <a:rPr lang="en-US" dirty="0" smtClean="0"/>
-              <a:t>A Focus On What’s New &amp; Different</a:t>
+              <a:t>New &amp; Different</a:t>
             </a:r>
           </a:p>
         </p:txBody>
@@ -3161,7 +3172,19 @@
           <a:p>
             <a:r>
               <a:rPr lang="en-US" dirty="0" smtClean="0"/>
-              <a:t>Nothing is real, everything is injected</a:t>
+              <a:t>Nothing is </a:t>
+            </a:r>
+            <a:r>
+              <a:rPr lang="en-US" dirty="0" err="1" smtClean="0"/>
+              <a:t>new’ed</a:t>
+            </a:r>
+            <a:r>
+              <a:rPr lang="en-US" dirty="0" smtClean="0"/>
+              <a:t>, </a:t>
+            </a:r>
+            <a:r>
+              <a:rPr lang="en-US" dirty="0" smtClean="0"/>
+              <a:t>everything is injected</a:t>
             </a:r>
             <a:endParaRPr lang="en-US" dirty="0"/>
           </a:p>
@@ -3251,6 +3274,10 @@
           <a:bodyPr/>
           <a:lstStyle/>
           <a:p>
+            <a:r>
+              <a:rPr lang="en-US" dirty="0" smtClean="0"/>
+              <a:t>Razor Views</a:t>
+            </a:r>
             <a:endParaRPr lang="en-US" dirty="0"/>
           </a:p>
         </p:txBody>
@@ -3270,10 +3297,38 @@
           <a:bodyPr/>
           <a:lstStyle/>
           <a:p>
-            <a:endParaRPr lang="en-US"/>
-          </a:p>
-        </p:txBody>
-      </p:sp>
+            <a:r>
+              <a:rPr lang="en-US" dirty="0" smtClean="0"/>
+              <a:t>Same syntax, structure and conventions</a:t>
+            </a:r>
+            <a:endParaRPr lang="en-US" dirty="0"/>
+          </a:p>
+        </p:txBody>
+      </p:sp>
+      <p:pic>
+        <p:nvPicPr>
+          <p:cNvPr id="4" name="Picture 3"/>
+          <p:cNvPicPr>
+            <a:picLocks noChangeAspect="1"/>
+          </p:cNvPicPr>
+          <p:nvPr/>
+        </p:nvPicPr>
+        <p:blipFill>
+          <a:blip r:embed="rId2"/>
+          <a:stretch>
+            <a:fillRect/>
+          </a:stretch>
+        </p:blipFill>
+        <p:spPr>
+          <a:xfrm>
+            <a:off x="1447800" y="2362200"/>
+            <a:ext cx="6400800" cy="3086100"/>
+          </a:xfrm>
+          <a:prstGeom prst="rect">
+            <a:avLst/>
+          </a:prstGeom>
+        </p:spPr>
+      </p:pic>
     </p:spTree>
     <p:extLst>
       <p:ext uri="{BB962C8B-B14F-4D97-AF65-F5344CB8AC3E}">
@@ -3324,7 +3379,11 @@
           <a:p>
             <a:r>
               <a:rPr lang="en-US" dirty="0" smtClean="0"/>
-              <a:t>Topics</a:t>
+              <a:t>_</a:t>
+            </a:r>
+            <a:r>
+              <a:rPr lang="en-US" dirty="0" err="1" smtClean="0"/>
+              <a:t>ViewImports</a:t>
             </a:r>
             <a:endParaRPr lang="en-US" dirty="0"/>
           </a:p>
@@ -3346,87 +3405,47 @@
           <a:lstStyle/>
           <a:p>
             <a:r>
-              <a:rPr lang="en-US" sz="1400" dirty="0" smtClean="0"/>
-              <a:t>Tag helpers</a:t>
-            </a:r>
-          </a:p>
-          <a:p>
-            <a:r>
-              <a:rPr lang="en-US" sz="1400" dirty="0" smtClean="0"/>
-              <a:t>View components</a:t>
-            </a:r>
-          </a:p>
-          <a:p>
-            <a:r>
-              <a:rPr lang="en-US" sz="1400" dirty="0" smtClean="0"/>
-              <a:t>_</a:t>
-            </a:r>
-            <a:r>
-              <a:rPr lang="en-US" sz="1400" dirty="0" err="1" smtClean="0"/>
-              <a:t>viewimports</a:t>
-            </a:r>
-            <a:endParaRPr lang="en-US" sz="1400" dirty="0" smtClean="0"/>
-          </a:p>
-          <a:p>
-            <a:r>
-              <a:rPr lang="en-US" sz="1400" dirty="0" smtClean="0"/>
-              <a:t>@inject</a:t>
-            </a:r>
-          </a:p>
-          <a:p>
-            <a:r>
-              <a:rPr lang="en-US" sz="1400" dirty="0" smtClean="0"/>
-              <a:t>Model binding and model binding attributes</a:t>
-            </a:r>
-          </a:p>
-          <a:p>
-            <a:r>
-              <a:rPr lang="en-US" sz="1400" dirty="0" smtClean="0"/>
-              <a:t>Caching</a:t>
-            </a:r>
-          </a:p>
-          <a:p>
-            <a:r>
-              <a:rPr lang="en-US" sz="1400" dirty="0" smtClean="0"/>
-              <a:t>Sessions and response features</a:t>
-            </a:r>
-          </a:p>
-          <a:p>
-            <a:r>
-              <a:rPr lang="en-US" sz="1400" dirty="0" smtClean="0"/>
-              <a:t>CORS</a:t>
-            </a:r>
-          </a:p>
-          <a:p>
-            <a:r>
-              <a:rPr lang="en-US" sz="1400" dirty="0" smtClean="0"/>
-              <a:t>Compilation &amp; </a:t>
-            </a:r>
-            <a:r>
-              <a:rPr lang="en-US" sz="1400" dirty="0" err="1" smtClean="0"/>
-              <a:t>precompilation</a:t>
-            </a:r>
-            <a:endParaRPr lang="en-US" sz="1400" dirty="0" smtClean="0"/>
-          </a:p>
-          <a:p>
-            <a:r>
-              <a:rPr lang="en-US" sz="1400" dirty="0" err="1"/>
-              <a:t>Auth</a:t>
-            </a:r>
-            <a:endParaRPr lang="en-US" sz="1400" dirty="0"/>
-          </a:p>
-          <a:p>
-            <a:pPr marL="0" indent="0">
-              <a:buNone/>
-            </a:pPr>
-            <a:endParaRPr lang="en-US" sz="1400" dirty="0" smtClean="0"/>
-          </a:p>
-        </p:txBody>
-      </p:sp>
+              <a:rPr lang="en-US" dirty="0" smtClean="0"/>
+              <a:t>Bring in namespaces for view compilation</a:t>
+            </a:r>
+          </a:p>
+          <a:p>
+            <a:r>
+              <a:rPr lang="en-US" dirty="0" smtClean="0"/>
+              <a:t>Bring in tag helpers</a:t>
+            </a:r>
+            <a:endParaRPr lang="en-US" dirty="0"/>
+          </a:p>
+        </p:txBody>
+      </p:sp>
+      <p:pic>
+        <p:nvPicPr>
+          <p:cNvPr id="4" name="Picture 3"/>
+          <p:cNvPicPr>
+            <a:picLocks noChangeAspect="1"/>
+          </p:cNvPicPr>
+          <p:nvPr/>
+        </p:nvPicPr>
+        <p:blipFill>
+          <a:blip r:embed="rId2"/>
+          <a:stretch>
+            <a:fillRect/>
+          </a:stretch>
+        </p:blipFill>
+        <p:spPr>
+          <a:xfrm>
+            <a:off x="990600" y="3124200"/>
+            <a:ext cx="7410450" cy="2200275"/>
+          </a:xfrm>
+          <a:prstGeom prst="rect">
+            <a:avLst/>
+          </a:prstGeom>
+        </p:spPr>
+      </p:pic>
     </p:spTree>
     <p:extLst>
       <p:ext uri="{BB962C8B-B14F-4D97-AF65-F5344CB8AC3E}">
-        <p14:creationId xmlns:p14="http://schemas.microsoft.com/office/powerpoint/2010/main" val="730820621"/>
+        <p14:creationId xmlns:p14="http://schemas.microsoft.com/office/powerpoint/2010/main" val="2408251197"/>
       </p:ext>
     </p:extLst>
   </p:cSld>
@@ -3471,7 +3490,11 @@
           <a:bodyPr/>
           <a:lstStyle/>
           <a:p>
-            <a:endParaRPr lang="en-US"/>
+            <a:r>
+              <a:rPr lang="en-US" dirty="0" smtClean="0"/>
+              <a:t>@inject</a:t>
+            </a:r>
+            <a:endParaRPr lang="en-US" dirty="0"/>
           </a:p>
         </p:txBody>
       </p:sp>
@@ -3490,14 +3513,48 @@
           <a:bodyPr/>
           <a:lstStyle/>
           <a:p>
-            <a:endParaRPr lang="en-US"/>
-          </a:p>
-        </p:txBody>
-      </p:sp>
+            <a:r>
+              <a:rPr lang="en-US" dirty="0" smtClean="0"/>
+              <a:t>Creates a property</a:t>
+            </a:r>
+          </a:p>
+          <a:p>
+            <a:r>
+              <a:rPr lang="en-US" dirty="0" smtClean="0"/>
+              <a:t>Property populated by container</a:t>
+            </a:r>
+            <a:endParaRPr lang="en-US" dirty="0"/>
+          </a:p>
+        </p:txBody>
+      </p:sp>
+      <p:pic>
+        <p:nvPicPr>
+          <p:cNvPr id="4" name="Picture 3"/>
+          <p:cNvPicPr>
+            <a:picLocks noChangeAspect="1"/>
+          </p:cNvPicPr>
+          <p:nvPr/>
+        </p:nvPicPr>
+        <p:blipFill>
+          <a:blip r:embed="rId2"/>
+          <a:stretch>
+            <a:fillRect/>
+          </a:stretch>
+        </p:blipFill>
+        <p:spPr>
+          <a:xfrm>
+            <a:off x="1385887" y="3124200"/>
+            <a:ext cx="6372225" cy="1581150"/>
+          </a:xfrm>
+          <a:prstGeom prst="rect">
+            <a:avLst/>
+          </a:prstGeom>
+        </p:spPr>
+      </p:pic>
     </p:spTree>
     <p:extLst>
       <p:ext uri="{BB962C8B-B14F-4D97-AF65-F5344CB8AC3E}">
-        <p14:creationId xmlns:p14="http://schemas.microsoft.com/office/powerpoint/2010/main" val="2219176628"/>
+        <p14:creationId xmlns:p14="http://schemas.microsoft.com/office/powerpoint/2010/main" val="1845342651"/>
       </p:ext>
     </p:extLst>
   </p:cSld>
@@ -3507,6 +3564,734 @@
   <p:transition>
     <p:fade/>
   </p:transition>
+  <p:timing>
+    <p:tnLst>
+      <p:par>
+        <p:cTn id="1" dur="indefinite" restart="never" nodeType="tmRoot"/>
+      </p:par>
+    </p:tnLst>
+  </p:timing>
+</p:sld>
+</file>
+
+<file path=ppt/slides/slide16.xml><?xml version="1.0" encoding="utf-8"?>
+<p:sld xmlns:a="http://schemas.openxmlformats.org/drawingml/2006/main" xmlns:r="http://schemas.openxmlformats.org/officeDocument/2006/relationships" xmlns:p="http://schemas.openxmlformats.org/presentationml/2006/main">
+  <p:cSld>
+    <p:spTree>
+      <p:nvGrpSpPr>
+        <p:cNvPr id="1" name=""/>
+        <p:cNvGrpSpPr/>
+        <p:nvPr/>
+      </p:nvGrpSpPr>
+      <p:grpSpPr>
+        <a:xfrm>
+          <a:off x="0" y="0"/>
+          <a:ext cx="0" cy="0"/>
+          <a:chOff x="0" y="0"/>
+          <a:chExt cx="0" cy="0"/>
+        </a:xfrm>
+      </p:grpSpPr>
+      <p:sp>
+        <p:nvSpPr>
+          <p:cNvPr id="2" name="Title 1"/>
+          <p:cNvSpPr>
+            <a:spLocks noGrp="1"/>
+          </p:cNvSpPr>
+          <p:nvPr>
+            <p:ph type="title"/>
+          </p:nvPr>
+        </p:nvSpPr>
+        <p:spPr/>
+        <p:txBody>
+          <a:bodyPr/>
+          <a:lstStyle/>
+          <a:p>
+            <a:r>
+              <a:rPr lang="en-US" dirty="0" smtClean="0"/>
+              <a:t>View Components</a:t>
+            </a:r>
+            <a:endParaRPr lang="en-US" dirty="0"/>
+          </a:p>
+        </p:txBody>
+      </p:sp>
+      <p:sp>
+        <p:nvSpPr>
+          <p:cNvPr id="3" name="Text Placeholder 2"/>
+          <p:cNvSpPr>
+            <a:spLocks noGrp="1"/>
+          </p:cNvSpPr>
+          <p:nvPr>
+            <p:ph type="body" idx="1"/>
+          </p:nvPr>
+        </p:nvSpPr>
+        <p:spPr/>
+        <p:txBody>
+          <a:bodyPr/>
+          <a:lstStyle/>
+          <a:p>
+            <a:r>
+              <a:rPr lang="en-US" dirty="0" smtClean="0"/>
+              <a:t>An upgrade to partial views</a:t>
+            </a:r>
+          </a:p>
+          <a:p>
+            <a:pPr lvl="1"/>
+            <a:r>
+              <a:rPr lang="en-US" dirty="0" smtClean="0"/>
+              <a:t>Particularly child actions and custom HTML helpers</a:t>
+            </a:r>
+            <a:endParaRPr lang="en-US" dirty="0"/>
+          </a:p>
+        </p:txBody>
+      </p:sp>
+      <p:pic>
+        <p:nvPicPr>
+          <p:cNvPr id="4" name="Picture 3"/>
+          <p:cNvPicPr>
+            <a:picLocks noChangeAspect="1"/>
+          </p:cNvPicPr>
+          <p:nvPr/>
+        </p:nvPicPr>
+        <p:blipFill>
+          <a:blip r:embed="rId2"/>
+          <a:stretch>
+            <a:fillRect/>
+          </a:stretch>
+        </p:blipFill>
+        <p:spPr>
+          <a:xfrm>
+            <a:off x="313204" y="2876550"/>
+            <a:ext cx="8391525" cy="3638550"/>
+          </a:xfrm>
+          <a:prstGeom prst="rect">
+            <a:avLst/>
+          </a:prstGeom>
+        </p:spPr>
+      </p:pic>
+      <p:pic>
+        <p:nvPicPr>
+          <p:cNvPr id="5" name="Picture 4"/>
+          <p:cNvPicPr>
+            <a:picLocks noChangeAspect="1"/>
+          </p:cNvPicPr>
+          <p:nvPr/>
+        </p:nvPicPr>
+        <p:blipFill>
+          <a:blip r:embed="rId3"/>
+          <a:stretch>
+            <a:fillRect/>
+          </a:stretch>
+        </p:blipFill>
+        <p:spPr>
+          <a:xfrm>
+            <a:off x="2819400" y="2329143"/>
+            <a:ext cx="6115050" cy="361950"/>
+          </a:xfrm>
+          <a:prstGeom prst="rect">
+            <a:avLst/>
+          </a:prstGeom>
+        </p:spPr>
+      </p:pic>
+    </p:spTree>
+    <p:extLst>
+      <p:ext uri="{BB962C8B-B14F-4D97-AF65-F5344CB8AC3E}">
+        <p14:creationId xmlns:p14="http://schemas.microsoft.com/office/powerpoint/2010/main" val="2412678608"/>
+      </p:ext>
+    </p:extLst>
+  </p:cSld>
+  <p:clrMapOvr>
+    <a:masterClrMapping/>
+  </p:clrMapOvr>
+  <p:transition>
+    <p:fade/>
+  </p:transition>
+  <p:timing>
+    <p:tnLst>
+      <p:par>
+        <p:cTn id="1" dur="indefinite" restart="never" nodeType="tmRoot">
+          <p:childTnLst>
+            <p:seq concurrent="1" nextAc="seek">
+              <p:cTn id="2" dur="indefinite" nodeType="mainSeq">
+                <p:childTnLst>
+                  <p:par>
+                    <p:cTn id="3" fill="hold">
+                      <p:stCondLst>
+                        <p:cond delay="indefinite"/>
+                      </p:stCondLst>
+                      <p:childTnLst>
+                        <p:par>
+                          <p:cTn id="4" fill="hold">
+                            <p:stCondLst>
+                              <p:cond delay="0"/>
+                            </p:stCondLst>
+                            <p:childTnLst>
+                              <p:par>
+                                <p:cTn id="5" presetID="10" presetClass="entr" presetSubtype="0" fill="hold" nodeType="clickEffect">
+                                  <p:stCondLst>
+                                    <p:cond delay="0"/>
+                                  </p:stCondLst>
+                                  <p:childTnLst>
+                                    <p:set>
+                                      <p:cBhvr>
+                                        <p:cTn id="6" dur="1" fill="hold">
+                                          <p:stCondLst>
+                                            <p:cond delay="0"/>
+                                          </p:stCondLst>
+                                        </p:cTn>
+                                        <p:tgtEl>
+                                          <p:spTgt spid="5"/>
+                                        </p:tgtEl>
+                                        <p:attrNameLst>
+                                          <p:attrName>style.visibility</p:attrName>
+                                        </p:attrNameLst>
+                                      </p:cBhvr>
+                                      <p:to>
+                                        <p:strVal val="visible"/>
+                                      </p:to>
+                                    </p:set>
+                                    <p:animEffect transition="in" filter="fade">
+                                      <p:cBhvr>
+                                        <p:cTn id="7" dur="500"/>
+                                        <p:tgtEl>
+                                          <p:spTgt spid="5"/>
+                                        </p:tgtEl>
+                                      </p:cBhvr>
+                                    </p:animEffect>
+                                  </p:childTnLst>
+                                </p:cTn>
+                              </p:par>
+                            </p:childTnLst>
+                          </p:cTn>
+                        </p:par>
+                      </p:childTnLst>
+                    </p:cTn>
+                  </p:par>
+                </p:childTnLst>
+              </p:cTn>
+              <p:prevCondLst>
+                <p:cond evt="onPrev" delay="0">
+                  <p:tgtEl>
+                    <p:sldTgt/>
+                  </p:tgtEl>
+                </p:cond>
+              </p:prevCondLst>
+              <p:nextCondLst>
+                <p:cond evt="onNext" delay="0">
+                  <p:tgtEl>
+                    <p:sldTgt/>
+                  </p:tgtEl>
+                </p:cond>
+              </p:nextCondLst>
+            </p:seq>
+          </p:childTnLst>
+        </p:cTn>
+      </p:par>
+    </p:tnLst>
+  </p:timing>
+</p:sld>
+</file>
+
+<file path=ppt/slides/slide17.xml><?xml version="1.0" encoding="utf-8"?>
+<p:sld xmlns:a="http://schemas.openxmlformats.org/drawingml/2006/main" xmlns:r="http://schemas.openxmlformats.org/officeDocument/2006/relationships" xmlns:p="http://schemas.openxmlformats.org/presentationml/2006/main">
+  <p:cSld>
+    <p:spTree>
+      <p:nvGrpSpPr>
+        <p:cNvPr id="1" name=""/>
+        <p:cNvGrpSpPr/>
+        <p:nvPr/>
+      </p:nvGrpSpPr>
+      <p:grpSpPr>
+        <a:xfrm>
+          <a:off x="0" y="0"/>
+          <a:ext cx="0" cy="0"/>
+          <a:chOff x="0" y="0"/>
+          <a:chExt cx="0" cy="0"/>
+        </a:xfrm>
+      </p:grpSpPr>
+      <p:sp>
+        <p:nvSpPr>
+          <p:cNvPr id="2" name="Title 1"/>
+          <p:cNvSpPr>
+            <a:spLocks noGrp="1"/>
+          </p:cNvSpPr>
+          <p:nvPr>
+            <p:ph type="title"/>
+          </p:nvPr>
+        </p:nvSpPr>
+        <p:spPr/>
+        <p:txBody>
+          <a:bodyPr/>
+          <a:lstStyle/>
+          <a:p>
+            <a:r>
+              <a:rPr lang="en-US" dirty="0" smtClean="0"/>
+              <a:t>Tag Helpers</a:t>
+            </a:r>
+            <a:endParaRPr lang="en-US" dirty="0"/>
+          </a:p>
+        </p:txBody>
+      </p:sp>
+      <p:sp>
+        <p:nvSpPr>
+          <p:cNvPr id="3" name="Text Placeholder 2"/>
+          <p:cNvSpPr>
+            <a:spLocks noGrp="1"/>
+          </p:cNvSpPr>
+          <p:nvPr>
+            <p:ph type="body" idx="1"/>
+          </p:nvPr>
+        </p:nvSpPr>
+        <p:spPr/>
+        <p:txBody>
+          <a:bodyPr/>
+          <a:lstStyle/>
+          <a:p>
+            <a:r>
+              <a:rPr lang="en-US" dirty="0" smtClean="0"/>
+              <a:t>An upgrade to HTML helpers</a:t>
+            </a:r>
+            <a:endParaRPr lang="en-US" dirty="0"/>
+          </a:p>
+        </p:txBody>
+      </p:sp>
+      <p:pic>
+        <p:nvPicPr>
+          <p:cNvPr id="4" name="Picture 3"/>
+          <p:cNvPicPr>
+            <a:picLocks noChangeAspect="1"/>
+          </p:cNvPicPr>
+          <p:nvPr/>
+        </p:nvPicPr>
+        <p:blipFill>
+          <a:blip r:embed="rId2"/>
+          <a:stretch>
+            <a:fillRect/>
+          </a:stretch>
+        </p:blipFill>
+        <p:spPr>
+          <a:xfrm>
+            <a:off x="3276600" y="5105400"/>
+            <a:ext cx="5534025" cy="733425"/>
+          </a:xfrm>
+          <a:prstGeom prst="rect">
+            <a:avLst/>
+          </a:prstGeom>
+        </p:spPr>
+      </p:pic>
+      <p:pic>
+        <p:nvPicPr>
+          <p:cNvPr id="5" name="Picture 4"/>
+          <p:cNvPicPr>
+            <a:picLocks noChangeAspect="1"/>
+          </p:cNvPicPr>
+          <p:nvPr/>
+        </p:nvPicPr>
+        <p:blipFill>
+          <a:blip r:embed="rId3"/>
+          <a:stretch>
+            <a:fillRect/>
+          </a:stretch>
+        </p:blipFill>
+        <p:spPr>
+          <a:xfrm>
+            <a:off x="470647" y="2286000"/>
+            <a:ext cx="6048375" cy="1057275"/>
+          </a:xfrm>
+          <a:prstGeom prst="rect">
+            <a:avLst/>
+          </a:prstGeom>
+        </p:spPr>
+      </p:pic>
+      <p:pic>
+        <p:nvPicPr>
+          <p:cNvPr id="6" name="Picture 5"/>
+          <p:cNvPicPr>
+            <a:picLocks noChangeAspect="1"/>
+          </p:cNvPicPr>
+          <p:nvPr/>
+        </p:nvPicPr>
+        <p:blipFill>
+          <a:blip r:embed="rId4"/>
+          <a:stretch>
+            <a:fillRect/>
+          </a:stretch>
+        </p:blipFill>
+        <p:spPr>
+          <a:xfrm>
+            <a:off x="2057400" y="3785066"/>
+            <a:ext cx="5934075" cy="838200"/>
+          </a:xfrm>
+          <a:prstGeom prst="rect">
+            <a:avLst/>
+          </a:prstGeom>
+        </p:spPr>
+      </p:pic>
+    </p:spTree>
+    <p:extLst>
+      <p:ext uri="{BB962C8B-B14F-4D97-AF65-F5344CB8AC3E}">
+        <p14:creationId xmlns:p14="http://schemas.microsoft.com/office/powerpoint/2010/main" val="3061323454"/>
+      </p:ext>
+    </p:extLst>
+  </p:cSld>
+  <p:clrMapOvr>
+    <a:masterClrMapping/>
+  </p:clrMapOvr>
+  <p:transition>
+    <p:fade/>
+  </p:transition>
+  <p:timing>
+    <p:tnLst>
+      <p:par>
+        <p:cTn id="1" dur="indefinite" restart="never" nodeType="tmRoot">
+          <p:childTnLst>
+            <p:seq concurrent="1" nextAc="seek">
+              <p:cTn id="2" dur="indefinite" nodeType="mainSeq">
+                <p:childTnLst>
+                  <p:par>
+                    <p:cTn id="3" fill="hold">
+                      <p:stCondLst>
+                        <p:cond delay="indefinite"/>
+                      </p:stCondLst>
+                      <p:childTnLst>
+                        <p:par>
+                          <p:cTn id="4" fill="hold">
+                            <p:stCondLst>
+                              <p:cond delay="0"/>
+                            </p:stCondLst>
+                            <p:childTnLst>
+                              <p:par>
+                                <p:cTn id="5" presetID="10" presetClass="entr" presetSubtype="0" fill="hold" nodeType="clickEffect">
+                                  <p:stCondLst>
+                                    <p:cond delay="0"/>
+                                  </p:stCondLst>
+                                  <p:childTnLst>
+                                    <p:set>
+                                      <p:cBhvr>
+                                        <p:cTn id="6" dur="1" fill="hold">
+                                          <p:stCondLst>
+                                            <p:cond delay="0"/>
+                                          </p:stCondLst>
+                                        </p:cTn>
+                                        <p:tgtEl>
+                                          <p:spTgt spid="6"/>
+                                        </p:tgtEl>
+                                        <p:attrNameLst>
+                                          <p:attrName>style.visibility</p:attrName>
+                                        </p:attrNameLst>
+                                      </p:cBhvr>
+                                      <p:to>
+                                        <p:strVal val="visible"/>
+                                      </p:to>
+                                    </p:set>
+                                    <p:animEffect transition="in" filter="fade">
+                                      <p:cBhvr>
+                                        <p:cTn id="7" dur="500"/>
+                                        <p:tgtEl>
+                                          <p:spTgt spid="6"/>
+                                        </p:tgtEl>
+                                      </p:cBhvr>
+                                    </p:animEffect>
+                                  </p:childTnLst>
+                                </p:cTn>
+                              </p:par>
+                            </p:childTnLst>
+                          </p:cTn>
+                        </p:par>
+                      </p:childTnLst>
+                    </p:cTn>
+                  </p:par>
+                  <p:par>
+                    <p:cTn id="8" fill="hold">
+                      <p:stCondLst>
+                        <p:cond delay="indefinite"/>
+                      </p:stCondLst>
+                      <p:childTnLst>
+                        <p:par>
+                          <p:cTn id="9" fill="hold">
+                            <p:stCondLst>
+                              <p:cond delay="0"/>
+                            </p:stCondLst>
+                            <p:childTnLst>
+                              <p:par>
+                                <p:cTn id="10" presetID="10" presetClass="entr" presetSubtype="0" fill="hold" nodeType="clickEffect">
+                                  <p:stCondLst>
+                                    <p:cond delay="0"/>
+                                  </p:stCondLst>
+                                  <p:childTnLst>
+                                    <p:set>
+                                      <p:cBhvr>
+                                        <p:cTn id="11" dur="1" fill="hold">
+                                          <p:stCondLst>
+                                            <p:cond delay="0"/>
+                                          </p:stCondLst>
+                                        </p:cTn>
+                                        <p:tgtEl>
+                                          <p:spTgt spid="4"/>
+                                        </p:tgtEl>
+                                        <p:attrNameLst>
+                                          <p:attrName>style.visibility</p:attrName>
+                                        </p:attrNameLst>
+                                      </p:cBhvr>
+                                      <p:to>
+                                        <p:strVal val="visible"/>
+                                      </p:to>
+                                    </p:set>
+                                    <p:animEffect transition="in" filter="fade">
+                                      <p:cBhvr>
+                                        <p:cTn id="12" dur="500"/>
+                                        <p:tgtEl>
+                                          <p:spTgt spid="4"/>
+                                        </p:tgtEl>
+                                      </p:cBhvr>
+                                    </p:animEffect>
+                                  </p:childTnLst>
+                                </p:cTn>
+                              </p:par>
+                            </p:childTnLst>
+                          </p:cTn>
+                        </p:par>
+                      </p:childTnLst>
+                    </p:cTn>
+                  </p:par>
+                </p:childTnLst>
+              </p:cTn>
+              <p:prevCondLst>
+                <p:cond evt="onPrev" delay="0">
+                  <p:tgtEl>
+                    <p:sldTgt/>
+                  </p:tgtEl>
+                </p:cond>
+              </p:prevCondLst>
+              <p:nextCondLst>
+                <p:cond evt="onNext" delay="0">
+                  <p:tgtEl>
+                    <p:sldTgt/>
+                  </p:tgtEl>
+                </p:cond>
+              </p:nextCondLst>
+            </p:seq>
+          </p:childTnLst>
+        </p:cTn>
+      </p:par>
+    </p:tnLst>
+  </p:timing>
+</p:sld>
+</file>
+
+<file path=ppt/slides/slide18.xml><?xml version="1.0" encoding="utf-8"?>
+<p:sld xmlns:a="http://schemas.openxmlformats.org/drawingml/2006/main" xmlns:r="http://schemas.openxmlformats.org/officeDocument/2006/relationships" xmlns:p="http://schemas.openxmlformats.org/presentationml/2006/main">
+  <p:cSld>
+    <p:spTree>
+      <p:nvGrpSpPr>
+        <p:cNvPr id="1" name=""/>
+        <p:cNvGrpSpPr/>
+        <p:nvPr/>
+      </p:nvGrpSpPr>
+      <p:grpSpPr>
+        <a:xfrm>
+          <a:off x="0" y="0"/>
+          <a:ext cx="0" cy="0"/>
+          <a:chOff x="0" y="0"/>
+          <a:chExt cx="0" cy="0"/>
+        </a:xfrm>
+      </p:grpSpPr>
+      <p:sp>
+        <p:nvSpPr>
+          <p:cNvPr id="2" name="Title 1"/>
+          <p:cNvSpPr>
+            <a:spLocks noGrp="1"/>
+          </p:cNvSpPr>
+          <p:nvPr>
+            <p:ph type="title"/>
+          </p:nvPr>
+        </p:nvSpPr>
+        <p:spPr/>
+        <p:txBody>
+          <a:bodyPr/>
+          <a:lstStyle/>
+          <a:p>
+            <a:r>
+              <a:rPr lang="en-US" dirty="0" smtClean="0"/>
+              <a:t>Form Helpers</a:t>
+            </a:r>
+            <a:endParaRPr lang="en-US" dirty="0"/>
+          </a:p>
+        </p:txBody>
+      </p:sp>
+      <p:sp>
+        <p:nvSpPr>
+          <p:cNvPr id="3" name="Text Placeholder 2"/>
+          <p:cNvSpPr>
+            <a:spLocks noGrp="1"/>
+          </p:cNvSpPr>
+          <p:nvPr>
+            <p:ph type="body" idx="1"/>
+          </p:nvPr>
+        </p:nvSpPr>
+        <p:spPr/>
+        <p:txBody>
+          <a:bodyPr/>
+          <a:lstStyle/>
+          <a:p>
+            <a:r>
+              <a:rPr lang="en-US" dirty="0"/>
+              <a:t>a</a:t>
+            </a:r>
+            <a:r>
+              <a:rPr lang="en-US" dirty="0" smtClean="0"/>
+              <a:t>sp-for works with</a:t>
+            </a:r>
+          </a:p>
+          <a:p>
+            <a:pPr lvl="1"/>
+            <a:r>
+              <a:rPr lang="en-US" dirty="0" smtClean="0"/>
+              <a:t>Labels</a:t>
+            </a:r>
+          </a:p>
+          <a:p>
+            <a:pPr lvl="1"/>
+            <a:r>
+              <a:rPr lang="en-US" dirty="0" smtClean="0"/>
+              <a:t>Inputs</a:t>
+            </a:r>
+          </a:p>
+          <a:p>
+            <a:pPr lvl="1"/>
+            <a:r>
+              <a:rPr lang="en-US" dirty="0" smtClean="0"/>
+              <a:t>Text areas</a:t>
+            </a:r>
+            <a:endParaRPr lang="en-US" dirty="0"/>
+          </a:p>
+        </p:txBody>
+      </p:sp>
+      <p:pic>
+        <p:nvPicPr>
+          <p:cNvPr id="4" name="Picture 3"/>
+          <p:cNvPicPr>
+            <a:picLocks noChangeAspect="1"/>
+          </p:cNvPicPr>
+          <p:nvPr/>
+        </p:nvPicPr>
+        <p:blipFill>
+          <a:blip r:embed="rId2"/>
+          <a:stretch>
+            <a:fillRect/>
+          </a:stretch>
+        </p:blipFill>
+        <p:spPr>
+          <a:xfrm>
+            <a:off x="1362075" y="3505200"/>
+            <a:ext cx="7324725" cy="1762125"/>
+          </a:xfrm>
+          <a:prstGeom prst="rect">
+            <a:avLst/>
+          </a:prstGeom>
+        </p:spPr>
+      </p:pic>
+    </p:spTree>
+    <p:extLst>
+      <p:ext uri="{BB962C8B-B14F-4D97-AF65-F5344CB8AC3E}">
+        <p14:creationId xmlns:p14="http://schemas.microsoft.com/office/powerpoint/2010/main" val="1845159621"/>
+      </p:ext>
+    </p:extLst>
+  </p:cSld>
+  <p:clrMapOvr>
+    <a:masterClrMapping/>
+  </p:clrMapOvr>
+  <p:transition>
+    <p:fade/>
+  </p:transition>
+  <p:timing>
+    <p:tnLst>
+      <p:par>
+        <p:cTn id="1" dur="indefinite" restart="never" nodeType="tmRoot"/>
+      </p:par>
+    </p:tnLst>
+  </p:timing>
+</p:sld>
+</file>
+
+<file path=ppt/slides/slide19.xml><?xml version="1.0" encoding="utf-8"?>
+<p:sld xmlns:a="http://schemas.openxmlformats.org/drawingml/2006/main" xmlns:r="http://schemas.openxmlformats.org/officeDocument/2006/relationships" xmlns:p="http://schemas.openxmlformats.org/presentationml/2006/main">
+  <p:cSld>
+    <p:spTree>
+      <p:nvGrpSpPr>
+        <p:cNvPr id="1" name=""/>
+        <p:cNvGrpSpPr/>
+        <p:nvPr/>
+      </p:nvGrpSpPr>
+      <p:grpSpPr>
+        <a:xfrm>
+          <a:off x="0" y="0"/>
+          <a:ext cx="0" cy="0"/>
+          <a:chOff x="0" y="0"/>
+          <a:chExt cx="0" cy="0"/>
+        </a:xfrm>
+      </p:grpSpPr>
+      <p:sp>
+        <p:nvSpPr>
+          <p:cNvPr id="2" name="Title 1"/>
+          <p:cNvSpPr>
+            <a:spLocks noGrp="1"/>
+          </p:cNvSpPr>
+          <p:nvPr>
+            <p:ph type="title"/>
+          </p:nvPr>
+        </p:nvSpPr>
+        <p:spPr/>
+        <p:txBody>
+          <a:bodyPr/>
+          <a:lstStyle/>
+          <a:p>
+            <a:r>
+              <a:rPr lang="en-US" dirty="0" smtClean="0"/>
+              <a:t>Model Binding</a:t>
+            </a:r>
+            <a:endParaRPr lang="en-US" dirty="0"/>
+          </a:p>
+        </p:txBody>
+      </p:sp>
+      <p:sp>
+        <p:nvSpPr>
+          <p:cNvPr id="3" name="Text Placeholder 2"/>
+          <p:cNvSpPr>
+            <a:spLocks noGrp="1"/>
+          </p:cNvSpPr>
+          <p:nvPr>
+            <p:ph type="body" idx="1"/>
+          </p:nvPr>
+        </p:nvSpPr>
+        <p:spPr/>
+        <p:txBody>
+          <a:bodyPr/>
+          <a:lstStyle/>
+          <a:p>
+            <a:endParaRPr lang="en-US" dirty="0"/>
+          </a:p>
+        </p:txBody>
+      </p:sp>
+    </p:spTree>
+    <p:extLst>
+      <p:ext uri="{BB962C8B-B14F-4D97-AF65-F5344CB8AC3E}">
+        <p14:creationId xmlns:p14="http://schemas.microsoft.com/office/powerpoint/2010/main" val="1900096064"/>
+      </p:ext>
+    </p:extLst>
+  </p:cSld>
+  <p:clrMapOvr>
+    <a:masterClrMapping/>
+  </p:clrMapOvr>
+  <p:transition>
+    <p:fade/>
+  </p:transition>
+  <p:timing>
+    <p:tnLst>
+      <p:par>
+        <p:cTn id="1" dur="indefinite" restart="never" nodeType="tmRoot"/>
+      </p:par>
+    </p:tnLst>
+  </p:timing>
 </p:sld>
 </file>
 
@@ -3629,6 +4414,416 @@
   <p:transition>
     <p:fade/>
   </p:transition>
+</p:sld>
+</file>
+
+<file path=ppt/slides/slide20.xml><?xml version="1.0" encoding="utf-8"?>
+<p:sld xmlns:a="http://schemas.openxmlformats.org/drawingml/2006/main" xmlns:r="http://schemas.openxmlformats.org/officeDocument/2006/relationships" xmlns:p="http://schemas.openxmlformats.org/presentationml/2006/main">
+  <p:cSld>
+    <p:spTree>
+      <p:nvGrpSpPr>
+        <p:cNvPr id="1" name=""/>
+        <p:cNvGrpSpPr/>
+        <p:nvPr/>
+      </p:nvGrpSpPr>
+      <p:grpSpPr>
+        <a:xfrm>
+          <a:off x="0" y="0"/>
+          <a:ext cx="0" cy="0"/>
+          <a:chOff x="0" y="0"/>
+          <a:chExt cx="0" cy="0"/>
+        </a:xfrm>
+      </p:grpSpPr>
+      <p:sp>
+        <p:nvSpPr>
+          <p:cNvPr id="2" name="Title 1"/>
+          <p:cNvSpPr>
+            <a:spLocks noGrp="1"/>
+          </p:cNvSpPr>
+          <p:nvPr>
+            <p:ph type="title"/>
+          </p:nvPr>
+        </p:nvSpPr>
+        <p:spPr/>
+        <p:txBody>
+          <a:bodyPr/>
+          <a:lstStyle/>
+          <a:p>
+            <a:r>
+              <a:rPr lang="en-US" dirty="0" smtClean="0"/>
+              <a:t>Caching</a:t>
+            </a:r>
+            <a:endParaRPr lang="en-US" dirty="0"/>
+          </a:p>
+        </p:txBody>
+      </p:sp>
+      <p:sp>
+        <p:nvSpPr>
+          <p:cNvPr id="3" name="Text Placeholder 2"/>
+          <p:cNvSpPr>
+            <a:spLocks noGrp="1"/>
+          </p:cNvSpPr>
+          <p:nvPr>
+            <p:ph type="body" idx="1"/>
+          </p:nvPr>
+        </p:nvSpPr>
+        <p:spPr/>
+        <p:txBody>
+          <a:bodyPr/>
+          <a:lstStyle/>
+          <a:p>
+            <a:endParaRPr lang="en-US"/>
+          </a:p>
+        </p:txBody>
+      </p:sp>
+    </p:spTree>
+    <p:extLst>
+      <p:ext uri="{BB962C8B-B14F-4D97-AF65-F5344CB8AC3E}">
+        <p14:creationId xmlns:p14="http://schemas.microsoft.com/office/powerpoint/2010/main" val="639469995"/>
+      </p:ext>
+    </p:extLst>
+  </p:cSld>
+  <p:clrMapOvr>
+    <a:masterClrMapping/>
+  </p:clrMapOvr>
+  <p:transition>
+    <p:fade/>
+  </p:transition>
+  <p:timing>
+    <p:tnLst>
+      <p:par>
+        <p:cTn id="1" dur="indefinite" restart="never" nodeType="tmRoot"/>
+      </p:par>
+    </p:tnLst>
+  </p:timing>
+</p:sld>
+</file>
+
+<file path=ppt/slides/slide21.xml><?xml version="1.0" encoding="utf-8"?>
+<p:sld xmlns:a="http://schemas.openxmlformats.org/drawingml/2006/main" xmlns:r="http://schemas.openxmlformats.org/officeDocument/2006/relationships" xmlns:p="http://schemas.openxmlformats.org/presentationml/2006/main">
+  <p:cSld>
+    <p:spTree>
+      <p:nvGrpSpPr>
+        <p:cNvPr id="1" name=""/>
+        <p:cNvGrpSpPr/>
+        <p:nvPr/>
+      </p:nvGrpSpPr>
+      <p:grpSpPr>
+        <a:xfrm>
+          <a:off x="0" y="0"/>
+          <a:ext cx="0" cy="0"/>
+          <a:chOff x="0" y="0"/>
+          <a:chExt cx="0" cy="0"/>
+        </a:xfrm>
+      </p:grpSpPr>
+      <p:sp>
+        <p:nvSpPr>
+          <p:cNvPr id="2" name="Title 1"/>
+          <p:cNvSpPr>
+            <a:spLocks noGrp="1"/>
+          </p:cNvSpPr>
+          <p:nvPr>
+            <p:ph type="title"/>
+          </p:nvPr>
+        </p:nvSpPr>
+        <p:spPr/>
+        <p:txBody>
+          <a:bodyPr/>
+          <a:lstStyle/>
+          <a:p>
+            <a:r>
+              <a:rPr lang="en-US" dirty="0" smtClean="0"/>
+              <a:t>CORS</a:t>
+            </a:r>
+            <a:endParaRPr lang="en-US" dirty="0"/>
+          </a:p>
+        </p:txBody>
+      </p:sp>
+      <p:sp>
+        <p:nvSpPr>
+          <p:cNvPr id="3" name="Text Placeholder 2"/>
+          <p:cNvSpPr>
+            <a:spLocks noGrp="1"/>
+          </p:cNvSpPr>
+          <p:nvPr>
+            <p:ph type="body" idx="1"/>
+          </p:nvPr>
+        </p:nvSpPr>
+        <p:spPr/>
+        <p:txBody>
+          <a:bodyPr/>
+          <a:lstStyle/>
+          <a:p>
+            <a:endParaRPr lang="en-US"/>
+          </a:p>
+        </p:txBody>
+      </p:sp>
+    </p:spTree>
+    <p:extLst>
+      <p:ext uri="{BB962C8B-B14F-4D97-AF65-F5344CB8AC3E}">
+        <p14:creationId xmlns:p14="http://schemas.microsoft.com/office/powerpoint/2010/main" val="2004960745"/>
+      </p:ext>
+    </p:extLst>
+  </p:cSld>
+  <p:clrMapOvr>
+    <a:masterClrMapping/>
+  </p:clrMapOvr>
+  <p:transition>
+    <p:fade/>
+  </p:transition>
+  <p:timing>
+    <p:tnLst>
+      <p:par>
+        <p:cTn id="1" dur="indefinite" restart="never" nodeType="tmRoot"/>
+      </p:par>
+    </p:tnLst>
+  </p:timing>
+</p:sld>
+</file>
+
+<file path=ppt/slides/slide22.xml><?xml version="1.0" encoding="utf-8"?>
+<p:sld xmlns:a="http://schemas.openxmlformats.org/drawingml/2006/main" xmlns:r="http://schemas.openxmlformats.org/officeDocument/2006/relationships" xmlns:p="http://schemas.openxmlformats.org/presentationml/2006/main">
+  <p:cSld>
+    <p:spTree>
+      <p:nvGrpSpPr>
+        <p:cNvPr id="1" name=""/>
+        <p:cNvGrpSpPr/>
+        <p:nvPr/>
+      </p:nvGrpSpPr>
+      <p:grpSpPr>
+        <a:xfrm>
+          <a:off x="0" y="0"/>
+          <a:ext cx="0" cy="0"/>
+          <a:chOff x="0" y="0"/>
+          <a:chExt cx="0" cy="0"/>
+        </a:xfrm>
+      </p:grpSpPr>
+      <p:sp>
+        <p:nvSpPr>
+          <p:cNvPr id="2" name="Title 1"/>
+          <p:cNvSpPr>
+            <a:spLocks noGrp="1"/>
+          </p:cNvSpPr>
+          <p:nvPr>
+            <p:ph type="title"/>
+          </p:nvPr>
+        </p:nvSpPr>
+        <p:spPr/>
+        <p:txBody>
+          <a:bodyPr/>
+          <a:lstStyle/>
+          <a:p>
+            <a:r>
+              <a:rPr lang="en-US" dirty="0" smtClean="0"/>
+              <a:t>Localization</a:t>
+            </a:r>
+            <a:endParaRPr lang="en-US" dirty="0"/>
+          </a:p>
+        </p:txBody>
+      </p:sp>
+      <p:sp>
+        <p:nvSpPr>
+          <p:cNvPr id="3" name="Text Placeholder 2"/>
+          <p:cNvSpPr>
+            <a:spLocks noGrp="1"/>
+          </p:cNvSpPr>
+          <p:nvPr>
+            <p:ph type="body" idx="1"/>
+          </p:nvPr>
+        </p:nvSpPr>
+        <p:spPr/>
+        <p:txBody>
+          <a:bodyPr/>
+          <a:lstStyle/>
+          <a:p>
+            <a:endParaRPr lang="en-US"/>
+          </a:p>
+        </p:txBody>
+      </p:sp>
+    </p:spTree>
+    <p:extLst>
+      <p:ext uri="{BB962C8B-B14F-4D97-AF65-F5344CB8AC3E}">
+        <p14:creationId xmlns:p14="http://schemas.microsoft.com/office/powerpoint/2010/main" val="3403549652"/>
+      </p:ext>
+    </p:extLst>
+  </p:cSld>
+  <p:clrMapOvr>
+    <a:masterClrMapping/>
+  </p:clrMapOvr>
+  <p:transition>
+    <p:fade/>
+  </p:transition>
+  <p:timing>
+    <p:tnLst>
+      <p:par>
+        <p:cTn id="1" dur="indefinite" restart="never" nodeType="tmRoot"/>
+      </p:par>
+    </p:tnLst>
+  </p:timing>
+</p:sld>
+</file>
+
+<file path=ppt/slides/slide23.xml><?xml version="1.0" encoding="utf-8"?>
+<p:sld xmlns:a="http://schemas.openxmlformats.org/drawingml/2006/main" xmlns:r="http://schemas.openxmlformats.org/officeDocument/2006/relationships" xmlns:p="http://schemas.openxmlformats.org/presentationml/2006/main">
+  <p:cSld>
+    <p:spTree>
+      <p:nvGrpSpPr>
+        <p:cNvPr id="1" name=""/>
+        <p:cNvGrpSpPr/>
+        <p:nvPr/>
+      </p:nvGrpSpPr>
+      <p:grpSpPr>
+        <a:xfrm>
+          <a:off x="0" y="0"/>
+          <a:ext cx="0" cy="0"/>
+          <a:chOff x="0" y="0"/>
+          <a:chExt cx="0" cy="0"/>
+        </a:xfrm>
+      </p:grpSpPr>
+      <p:sp>
+        <p:nvSpPr>
+          <p:cNvPr id="2" name="Title 1"/>
+          <p:cNvSpPr>
+            <a:spLocks noGrp="1"/>
+          </p:cNvSpPr>
+          <p:nvPr>
+            <p:ph type="title"/>
+          </p:nvPr>
+        </p:nvSpPr>
+        <p:spPr/>
+        <p:txBody>
+          <a:bodyPr/>
+          <a:lstStyle/>
+          <a:p>
+            <a:r>
+              <a:rPr lang="en-US" dirty="0" smtClean="0"/>
+              <a:t>Using Features</a:t>
+            </a:r>
+            <a:endParaRPr lang="en-US" dirty="0"/>
+          </a:p>
+        </p:txBody>
+      </p:sp>
+      <p:sp>
+        <p:nvSpPr>
+          <p:cNvPr id="3" name="Text Placeholder 2"/>
+          <p:cNvSpPr>
+            <a:spLocks noGrp="1"/>
+          </p:cNvSpPr>
+          <p:nvPr>
+            <p:ph type="body" idx="1"/>
+          </p:nvPr>
+        </p:nvSpPr>
+        <p:spPr/>
+        <p:txBody>
+          <a:bodyPr/>
+          <a:lstStyle/>
+          <a:p>
+            <a:endParaRPr lang="en-US"/>
+          </a:p>
+        </p:txBody>
+      </p:sp>
+    </p:spTree>
+    <p:extLst>
+      <p:ext uri="{BB962C8B-B14F-4D97-AF65-F5344CB8AC3E}">
+        <p14:creationId xmlns:p14="http://schemas.microsoft.com/office/powerpoint/2010/main" val="747166737"/>
+      </p:ext>
+    </p:extLst>
+  </p:cSld>
+  <p:clrMapOvr>
+    <a:masterClrMapping/>
+  </p:clrMapOvr>
+  <p:transition>
+    <p:fade/>
+  </p:transition>
+  <p:timing>
+    <p:tnLst>
+      <p:par>
+        <p:cTn id="1" dur="indefinite" restart="never" nodeType="tmRoot"/>
+      </p:par>
+    </p:tnLst>
+  </p:timing>
+</p:sld>
+</file>
+
+<file path=ppt/slides/slide24.xml><?xml version="1.0" encoding="utf-8"?>
+<p:sld xmlns:a="http://schemas.openxmlformats.org/drawingml/2006/main" xmlns:r="http://schemas.openxmlformats.org/officeDocument/2006/relationships" xmlns:p="http://schemas.openxmlformats.org/presentationml/2006/main">
+  <p:cSld>
+    <p:spTree>
+      <p:nvGrpSpPr>
+        <p:cNvPr id="1" name=""/>
+        <p:cNvGrpSpPr/>
+        <p:nvPr/>
+      </p:nvGrpSpPr>
+      <p:grpSpPr>
+        <a:xfrm>
+          <a:off x="0" y="0"/>
+          <a:ext cx="0" cy="0"/>
+          <a:chOff x="0" y="0"/>
+          <a:chExt cx="0" cy="0"/>
+        </a:xfrm>
+      </p:grpSpPr>
+      <p:sp>
+        <p:nvSpPr>
+          <p:cNvPr id="2" name="Title 1"/>
+          <p:cNvSpPr>
+            <a:spLocks noGrp="1"/>
+          </p:cNvSpPr>
+          <p:nvPr>
+            <p:ph type="title"/>
+          </p:nvPr>
+        </p:nvSpPr>
+        <p:spPr/>
+        <p:txBody>
+          <a:bodyPr/>
+          <a:lstStyle/>
+          <a:p>
+            <a:r>
+              <a:rPr lang="en-US" dirty="0" smtClean="0"/>
+              <a:t>Summary</a:t>
+            </a:r>
+            <a:endParaRPr lang="en-US" dirty="0"/>
+          </a:p>
+        </p:txBody>
+      </p:sp>
+      <p:sp>
+        <p:nvSpPr>
+          <p:cNvPr id="3" name="Text Placeholder 2"/>
+          <p:cNvSpPr>
+            <a:spLocks noGrp="1"/>
+          </p:cNvSpPr>
+          <p:nvPr>
+            <p:ph type="body" idx="1"/>
+          </p:nvPr>
+        </p:nvSpPr>
+        <p:spPr/>
+        <p:txBody>
+          <a:bodyPr/>
+          <a:lstStyle/>
+          <a:p>
+            <a:endParaRPr lang="en-US"/>
+          </a:p>
+        </p:txBody>
+      </p:sp>
+    </p:spTree>
+    <p:extLst>
+      <p:ext uri="{BB962C8B-B14F-4D97-AF65-F5344CB8AC3E}">
+        <p14:creationId xmlns:p14="http://schemas.microsoft.com/office/powerpoint/2010/main" val="2219176628"/>
+      </p:ext>
+    </p:extLst>
+  </p:cSld>
+  <p:clrMapOvr>
+    <a:masterClrMapping/>
+  </p:clrMapOvr>
+  <p:transition>
+    <p:fade/>
+  </p:transition>
+  <p:timing>
+    <p:tnLst>
+      <p:par>
+        <p:cTn id="1" dur="indefinite" restart="never" nodeType="tmRoot"/>
+      </p:par>
+    </p:tnLst>
+  </p:timing>
 </p:sld>
 </file>
 

</xml_diff>